<commit_message>
adding the presentation slide
</commit_message>
<xml_diff>
--- a/presentation/ajd.pptx
+++ b/presentation/ajd.pptx
@@ -192,7 +192,7 @@
           <a:p>
             <a:fld id="{DC677B88-2DCB-5546-9740-6084D6A0A7DA}" type="datetimeFigureOut">
               <a:rPr lang="en-US" smtClean="0"/>
-              <a:t>8/12/16</a:t>
+              <a:t>8/13/16</a:t>
             </a:fld>
             <a:endParaRPr lang="en-US"/>
           </a:p>
@@ -725,7 +725,7 @@
           <a:p>
             <a:fld id="{F55A7E84-4931-4E4D-8E2B-ABE4AA8EADD3}" type="datetimeFigureOut">
               <a:rPr lang="en-US" smtClean="0"/>
-              <a:t>8/12/16</a:t>
+              <a:t>8/13/16</a:t>
             </a:fld>
             <a:endParaRPr lang="en-US"/>
           </a:p>
@@ -895,7 +895,7 @@
           <a:p>
             <a:fld id="{F55A7E84-4931-4E4D-8E2B-ABE4AA8EADD3}" type="datetimeFigureOut">
               <a:rPr lang="en-US" smtClean="0"/>
-              <a:t>8/12/16</a:t>
+              <a:t>8/13/16</a:t>
             </a:fld>
             <a:endParaRPr lang="en-US"/>
           </a:p>
@@ -1075,7 +1075,7 @@
           <a:p>
             <a:fld id="{F55A7E84-4931-4E4D-8E2B-ABE4AA8EADD3}" type="datetimeFigureOut">
               <a:rPr lang="en-US" smtClean="0"/>
-              <a:t>8/12/16</a:t>
+              <a:t>8/13/16</a:t>
             </a:fld>
             <a:endParaRPr lang="en-US"/>
           </a:p>
@@ -1245,7 +1245,7 @@
           <a:p>
             <a:fld id="{F55A7E84-4931-4E4D-8E2B-ABE4AA8EADD3}" type="datetimeFigureOut">
               <a:rPr lang="en-US" smtClean="0"/>
-              <a:t>8/12/16</a:t>
+              <a:t>8/13/16</a:t>
             </a:fld>
             <a:endParaRPr lang="en-US"/>
           </a:p>
@@ -1491,7 +1491,7 @@
           <a:p>
             <a:fld id="{F55A7E84-4931-4E4D-8E2B-ABE4AA8EADD3}" type="datetimeFigureOut">
               <a:rPr lang="en-US" smtClean="0"/>
-              <a:t>8/12/16</a:t>
+              <a:t>8/13/16</a:t>
             </a:fld>
             <a:endParaRPr lang="en-US"/>
           </a:p>
@@ -1779,7 +1779,7 @@
           <a:p>
             <a:fld id="{F55A7E84-4931-4E4D-8E2B-ABE4AA8EADD3}" type="datetimeFigureOut">
               <a:rPr lang="en-US" smtClean="0"/>
-              <a:t>8/12/16</a:t>
+              <a:t>8/13/16</a:t>
             </a:fld>
             <a:endParaRPr lang="en-US"/>
           </a:p>
@@ -2201,7 +2201,7 @@
           <a:p>
             <a:fld id="{F55A7E84-4931-4E4D-8E2B-ABE4AA8EADD3}" type="datetimeFigureOut">
               <a:rPr lang="en-US" smtClean="0"/>
-              <a:t>8/12/16</a:t>
+              <a:t>8/13/16</a:t>
             </a:fld>
             <a:endParaRPr lang="en-US"/>
           </a:p>
@@ -2319,7 +2319,7 @@
           <a:p>
             <a:fld id="{F55A7E84-4931-4E4D-8E2B-ABE4AA8EADD3}" type="datetimeFigureOut">
               <a:rPr lang="en-US" smtClean="0"/>
-              <a:t>8/12/16</a:t>
+              <a:t>8/13/16</a:t>
             </a:fld>
             <a:endParaRPr lang="en-US"/>
           </a:p>
@@ -2414,7 +2414,7 @@
           <a:p>
             <a:fld id="{F55A7E84-4931-4E4D-8E2B-ABE4AA8EADD3}" type="datetimeFigureOut">
               <a:rPr lang="en-US" smtClean="0"/>
-              <a:t>8/12/16</a:t>
+              <a:t>8/13/16</a:t>
             </a:fld>
             <a:endParaRPr lang="en-US"/>
           </a:p>
@@ -2691,7 +2691,7 @@
           <a:p>
             <a:fld id="{F55A7E84-4931-4E4D-8E2B-ABE4AA8EADD3}" type="datetimeFigureOut">
               <a:rPr lang="en-US" smtClean="0"/>
-              <a:t>8/12/16</a:t>
+              <a:t>8/13/16</a:t>
             </a:fld>
             <a:endParaRPr lang="en-US"/>
           </a:p>
@@ -2944,7 +2944,7 @@
           <a:p>
             <a:fld id="{F55A7E84-4931-4E4D-8E2B-ABE4AA8EADD3}" type="datetimeFigureOut">
               <a:rPr lang="en-US" smtClean="0"/>
-              <a:t>8/12/16</a:t>
+              <a:t>8/13/16</a:t>
             </a:fld>
             <a:endParaRPr lang="en-US"/>
           </a:p>
@@ -3157,7 +3157,7 @@
           <a:p>
             <a:fld id="{F55A7E84-4931-4E4D-8E2B-ABE4AA8EADD3}" type="datetimeFigureOut">
               <a:rPr lang="en-US" smtClean="0"/>
-              <a:t>8/12/16</a:t>
+              <a:t>8/13/16</a:t>
             </a:fld>
             <a:endParaRPr lang="en-US"/>
           </a:p>
@@ -3893,7 +3893,7 @@
         </p:blipFill>
         <p:spPr>
           <a:xfrm>
-            <a:off x="780596" y="4135217"/>
+            <a:off x="948473" y="4135217"/>
             <a:ext cx="439720" cy="393072"/>
           </a:xfrm>
           <a:prstGeom prst="rect">
@@ -3914,8 +3914,8 @@
         </p:nvSpPr>
         <p:spPr>
           <a:xfrm>
-            <a:off x="35730" y="4703225"/>
-            <a:ext cx="2147815" cy="1754327"/>
+            <a:off x="204374" y="4703225"/>
+            <a:ext cx="2066759" cy="1938992"/>
           </a:xfrm>
           <a:prstGeom prst="rect">
             <a:avLst/>
@@ -3945,6 +3945,19 @@
               </a:rPr>
               <a:t> </a:t>
             </a:r>
+            <a:endParaRPr lang="en-US" sz="1200" u="sng" dirty="0" smtClean="0">
+              <a:solidFill>
+                <a:srgbClr val="000000"/>
+              </a:solidFill>
+            </a:endParaRPr>
+          </a:p>
+          <a:p>
+            <a:pPr algn="ctr"/>
+            <a:endParaRPr lang="en-US" sz="1200" u="sng" dirty="0" smtClean="0">
+              <a:solidFill>
+                <a:srgbClr val="000000"/>
+              </a:solidFill>
+            </a:endParaRPr>
           </a:p>
           <a:p>
             <a:pPr marL="171450" indent="-171450">
@@ -4058,7 +4071,7 @@
         </p:blipFill>
         <p:spPr>
           <a:xfrm>
-            <a:off x="2931031" y="4135217"/>
+            <a:off x="3018619" y="4135217"/>
             <a:ext cx="415406" cy="393073"/>
           </a:xfrm>
           <a:prstGeom prst="rect">
@@ -4079,8 +4092,8 @@
         </p:nvSpPr>
         <p:spPr>
           <a:xfrm>
-            <a:off x="2183545" y="4686397"/>
-            <a:ext cx="1975102" cy="1384995"/>
+            <a:off x="2271133" y="4686397"/>
+            <a:ext cx="1975102" cy="1569660"/>
           </a:xfrm>
           <a:prstGeom prst="rect">
             <a:avLst/>
@@ -4110,6 +4123,19 @@
               </a:rPr>
               <a:t> </a:t>
             </a:r>
+            <a:endParaRPr lang="en-US" sz="1200" u="sng" dirty="0" smtClean="0">
+              <a:solidFill>
+                <a:srgbClr val="000000"/>
+              </a:solidFill>
+            </a:endParaRPr>
+          </a:p>
+          <a:p>
+            <a:pPr algn="ctr"/>
+            <a:endParaRPr lang="en-US" sz="1200" u="sng" dirty="0" smtClean="0">
+              <a:solidFill>
+                <a:srgbClr val="000000"/>
+              </a:solidFill>
+            </a:endParaRPr>
           </a:p>
           <a:p>
             <a:pPr marL="171450" indent="-171450">
@@ -4179,7 +4205,7 @@
         </p:blipFill>
         <p:spPr>
           <a:xfrm>
-            <a:off x="5158412" y="4135217"/>
+            <a:off x="5246000" y="4135217"/>
             <a:ext cx="415406" cy="393073"/>
           </a:xfrm>
           <a:prstGeom prst="rect">
@@ -4200,8 +4226,8 @@
         </p:nvSpPr>
         <p:spPr>
           <a:xfrm>
-            <a:off x="4218904" y="4686397"/>
-            <a:ext cx="2350324" cy="1569660"/>
+            <a:off x="4306492" y="4686397"/>
+            <a:ext cx="2350324" cy="1754327"/>
           </a:xfrm>
           <a:prstGeom prst="rect">
             <a:avLst/>
@@ -4221,8 +4247,24 @@
                   <a:srgbClr val="000000"/>
                 </a:solidFill>
               </a:rPr>
-              <a:t>CODING SCHOOLS</a:t>
-            </a:r>
+              <a:t>CODING </a:t>
+            </a:r>
+            <a:r>
+              <a:rPr lang="en-US" sz="1200" b="1" u="sng" dirty="0" smtClean="0">
+                <a:solidFill>
+                  <a:srgbClr val="000000"/>
+                </a:solidFill>
+              </a:rPr>
+              <a:t>SCHOOLS</a:t>
+            </a:r>
+          </a:p>
+          <a:p>
+            <a:pPr algn="ctr"/>
+            <a:endParaRPr lang="en-US" sz="1200" b="1" u="sng" dirty="0" smtClean="0">
+              <a:solidFill>
+                <a:srgbClr val="000000"/>
+              </a:solidFill>
+            </a:endParaRPr>
           </a:p>
           <a:p>
             <a:pPr marL="171450" indent="-171450">
@@ -4292,7 +4334,7 @@
         </p:blipFill>
         <p:spPr>
           <a:xfrm>
-            <a:off x="7674015" y="4135217"/>
+            <a:off x="7761603" y="4135217"/>
             <a:ext cx="420819" cy="393073"/>
           </a:xfrm>
           <a:prstGeom prst="rect">
@@ -4313,8 +4355,8 @@
         </p:nvSpPr>
         <p:spPr>
           <a:xfrm>
-            <a:off x="6791211" y="4686397"/>
-            <a:ext cx="2259726" cy="1569660"/>
+            <a:off x="6878799" y="4686397"/>
+            <a:ext cx="2259726" cy="1754327"/>
           </a:xfrm>
           <a:prstGeom prst="rect">
             <a:avLst/>
@@ -4334,8 +4376,24 @@
                   <a:srgbClr val="000000"/>
                 </a:solidFill>
               </a:rPr>
-              <a:t>LOCAL BUSINESS'S</a:t>
-            </a:r>
+              <a:t>LOCAL </a:t>
+            </a:r>
+            <a:r>
+              <a:rPr lang="en-US" sz="1200" b="1" u="sng" dirty="0" smtClean="0">
+                <a:solidFill>
+                  <a:srgbClr val="000000"/>
+                </a:solidFill>
+              </a:rPr>
+              <a:t>BUSINESS'S</a:t>
+            </a:r>
+          </a:p>
+          <a:p>
+            <a:pPr algn="ctr"/>
+            <a:endParaRPr lang="en-US" sz="1200" b="1" u="sng" dirty="0" smtClean="0">
+              <a:solidFill>
+                <a:srgbClr val="000000"/>
+              </a:solidFill>
+            </a:endParaRPr>
           </a:p>
           <a:p>
             <a:pPr marL="171450" indent="-171450">

</xml_diff>